<commit_message>
Polished up the pptx presentation formatting.
Signed-off-by: Elliot Murphy <statik@users.noreply.github.com>
</commit_message>
<xml_diff>
--- a/worker/template.pptx
+++ b/worker/template.pptx
@@ -7,9 +7,7 @@
   <p:sldIdLst>
     <p:sldId id="256" r:id="rId2"/>
     <p:sldId id="257" r:id="rId3"/>
-    <p:sldId id="258" r:id="rId4"/>
-    <p:sldId id="259" r:id="rId5"/>
-    <p:sldId id="260" r:id="rId6"/>
+    <p:sldId id="260" r:id="rId4"/>
   </p:sldIdLst>
   <p:sldSz cx="9144000" cy="6858000" type="screen4x3"/>
   <p:notesSz cx="6858000" cy="9144000"/>
@@ -306,7 +304,7 @@
           <a:p>
             <a:fld id="{241EB5C9-1307-BA42-ABA2-0BC069CD8E7F}" type="datetimeFigureOut">
               <a:rPr lang="en-US" smtClean="0"/>
-              <a:t>8/18/18</a:t>
+              <a:t>6/11/19</a:t>
             </a:fld>
             <a:endParaRPr lang="en-US"/>
           </a:p>
@@ -474,7 +472,7 @@
           <a:p>
             <a:fld id="{241EB5C9-1307-BA42-ABA2-0BC069CD8E7F}" type="datetimeFigureOut">
               <a:rPr lang="en-US" smtClean="0"/>
-              <a:t>8/18/18</a:t>
+              <a:t>6/11/19</a:t>
             </a:fld>
             <a:endParaRPr lang="en-US"/>
           </a:p>
@@ -652,7 +650,7 @@
           <a:p>
             <a:fld id="{241EB5C9-1307-BA42-ABA2-0BC069CD8E7F}" type="datetimeFigureOut">
               <a:rPr lang="en-US" smtClean="0"/>
-              <a:t>8/18/18</a:t>
+              <a:t>6/11/19</a:t>
             </a:fld>
             <a:endParaRPr lang="en-US"/>
           </a:p>
@@ -820,7 +818,7 @@
           <a:p>
             <a:fld id="{241EB5C9-1307-BA42-ABA2-0BC069CD8E7F}" type="datetimeFigureOut">
               <a:rPr lang="en-US" smtClean="0"/>
-              <a:t>8/18/18</a:t>
+              <a:t>6/11/19</a:t>
             </a:fld>
             <a:endParaRPr lang="en-US"/>
           </a:p>
@@ -1065,7 +1063,7 @@
           <a:p>
             <a:fld id="{241EB5C9-1307-BA42-ABA2-0BC069CD8E7F}" type="datetimeFigureOut">
               <a:rPr lang="en-US" smtClean="0"/>
-              <a:t>8/18/18</a:t>
+              <a:t>6/11/19</a:t>
             </a:fld>
             <a:endParaRPr lang="en-US"/>
           </a:p>
@@ -1350,7 +1348,7 @@
           <a:p>
             <a:fld id="{241EB5C9-1307-BA42-ABA2-0BC069CD8E7F}" type="datetimeFigureOut">
               <a:rPr lang="en-US" smtClean="0"/>
-              <a:t>8/18/18</a:t>
+              <a:t>6/11/19</a:t>
             </a:fld>
             <a:endParaRPr lang="en-US"/>
           </a:p>
@@ -1769,7 +1767,7 @@
           <a:p>
             <a:fld id="{241EB5C9-1307-BA42-ABA2-0BC069CD8E7F}" type="datetimeFigureOut">
               <a:rPr lang="en-US" smtClean="0"/>
-              <a:t>8/18/18</a:t>
+              <a:t>6/11/19</a:t>
             </a:fld>
             <a:endParaRPr lang="en-US"/>
           </a:p>
@@ -1886,7 +1884,7 @@
           <a:p>
             <a:fld id="{241EB5C9-1307-BA42-ABA2-0BC069CD8E7F}" type="datetimeFigureOut">
               <a:rPr lang="en-US" smtClean="0"/>
-              <a:t>8/18/18</a:t>
+              <a:t>6/11/19</a:t>
             </a:fld>
             <a:endParaRPr lang="en-US"/>
           </a:p>
@@ -1981,7 +1979,7 @@
           <a:p>
             <a:fld id="{241EB5C9-1307-BA42-ABA2-0BC069CD8E7F}" type="datetimeFigureOut">
               <a:rPr lang="en-US" smtClean="0"/>
-              <a:t>8/18/18</a:t>
+              <a:t>6/11/19</a:t>
             </a:fld>
             <a:endParaRPr lang="en-US"/>
           </a:p>
@@ -2256,7 +2254,7 @@
           <a:p>
             <a:fld id="{241EB5C9-1307-BA42-ABA2-0BC069CD8E7F}" type="datetimeFigureOut">
               <a:rPr lang="en-US" smtClean="0"/>
-              <a:t>8/18/18</a:t>
+              <a:t>6/11/19</a:t>
             </a:fld>
             <a:endParaRPr lang="en-US"/>
           </a:p>
@@ -2508,7 +2506,7 @@
           <a:p>
             <a:fld id="{241EB5C9-1307-BA42-ABA2-0BC069CD8E7F}" type="datetimeFigureOut">
               <a:rPr lang="en-US" smtClean="0"/>
-              <a:t>8/18/18</a:t>
+              <a:t>6/11/19</a:t>
             </a:fld>
             <a:endParaRPr lang="en-US"/>
           </a:p>
@@ -2728,7 +2726,7 @@
           <a:p>
             <a:fld id="{241EB5C9-1307-BA42-ABA2-0BC069CD8E7F}" type="datetimeFigureOut">
               <a:rPr lang="en-US" smtClean="0"/>
-              <a:t>8/18/18</a:t>
+              <a:t>6/11/19</a:t>
             </a:fld>
             <a:endParaRPr lang="en-US"/>
           </a:p>
@@ -3123,28 +3121,11 @@
           <a:bodyPr/>
           <a:lstStyle/>
           <a:p>
-            <a:pPr lvl="0" marL="0" indent="0">
+            <a:pPr marL="0" lvl="0" indent="0">
               <a:buNone/>
             </a:pPr>
             <a:r>
-              <a:rPr/>
-              <a:t>Security</a:t>
-            </a:r>
-            <a:r>
-              <a:rPr/>
-              <a:t> </a:t>
-            </a:r>
-            <a:r>
-              <a:rPr/>
-              <a:t>Culture</a:t>
-            </a:r>
-            <a:r>
-              <a:rPr/>
-              <a:t> </a:t>
-            </a:r>
-            <a:r>
-              <a:rPr/>
-              <a:t>Diagnostic</a:t>
+              <a:t>Security Culture Diagnostic</a:t>
             </a:r>
           </a:p>
         </p:txBody>
@@ -3169,16 +3150,20 @@
           <a:bodyPr/>
           <a:lstStyle/>
           <a:p>
-            <a:pPr lvl="0" marL="0" indent="0">
+            <a:pPr marL="0" lvl="0" indent="0">
               <a:buNone/>
             </a:pPr>
             <a:br/>
             <a:br/>
+            <a:endParaRPr/>
           </a:p>
         </p:txBody>
       </p:sp>
     </p:spTree>
   </p:cSld>
+  <p:clrMapOvr>
+    <a:masterClrMapping/>
+  </p:clrMapOvr>
 </p:sld>
 </file>
 
@@ -3214,28 +3199,12 @@
           <a:bodyPr/>
           <a:lstStyle/>
           <a:p>
-            <a:pPr lvl="0" marL="0" indent="0">
+            <a:pPr marL="0" lvl="0" indent="0">
               <a:buNone/>
             </a:pPr>
             <a:r>
-              <a:rPr/>
-              <a:t>Security</a:t>
-            </a:r>
-            <a:r>
-              <a:rPr/>
-              <a:t> </a:t>
-            </a:r>
-            <a:r>
-              <a:rPr/>
-              <a:t>Culture</a:t>
-            </a:r>
-            <a:r>
-              <a:rPr/>
-              <a:t> </a:t>
-            </a:r>
-            <a:r>
-              <a:rPr/>
-              <a:t>Overview</a:t>
+              <a:rPr dirty="0"/>
+              <a:t>Security Culture Overview</a:t>
             </a:r>
           </a:p>
         </p:txBody>
@@ -3252,48 +3221,23 @@
         </p:nvSpPr>
         <p:spPr/>
         <p:txBody>
-          <a:bodyPr/>
-          <a:lstStyle/>
-          <a:p>
-            <a:pPr lvl="0" marL="0" indent="0">
+          <a:bodyPr>
+            <a:normAutofit/>
+          </a:bodyPr>
+          <a:lstStyle/>
+          <a:p>
+            <a:pPr marL="0" lvl="0" indent="0">
               <a:buNone/>
             </a:pPr>
-            <a:r>
-              <a:rPr/>
-              <a:t>This is an R Markdown presentation. Markdown is a simple formatting syntax for authoring HTML, PDF, and MS Word documents. For more details on using R Markdown see </a:t>
-            </a:r>
-            <a:r>
-              <a:rPr>
-                <a:hlinkClick r:id="rId2"/>
-              </a:rPr>
-              <a:t>Lance Hayden’s Work</a:t>
-            </a:r>
-            <a:r>
-              <a:rPr/>
-              <a:t>.</a:t>
-            </a:r>
-          </a:p>
-          <a:p>
-            <a:pPr lvl="0" marL="0" indent="0">
-              <a:buNone/>
-            </a:pPr>
-            <a:r>
-              <a:rPr/>
-              <a:t>When you click the </a:t>
-            </a:r>
-            <a:r>
-              <a:rPr b="1"/>
-              <a:t>Knit</a:t>
-            </a:r>
-            <a:r>
-              <a:rPr/>
-              <a:t> button a document will be generated that includes both content as well as the output of any embedded R code chunks within the document.</a:t>
-            </a:r>
+            <a:endParaRPr dirty="0"/>
           </a:p>
         </p:txBody>
       </p:sp>
     </p:spTree>
   </p:cSld>
+  <p:clrMapOvr>
+    <a:masterClrMapping/>
+  </p:clrMapOvr>
 </p:sld>
 </file>
 
@@ -3329,288 +3273,20 @@
           <a:bodyPr/>
           <a:lstStyle/>
           <a:p>
-            <a:pPr lvl="0" marL="0" indent="0">
+            <a:pPr marL="0" lvl="0" indent="0">
               <a:buNone/>
             </a:pPr>
             <a:r>
-              <a:rPr/>
-              <a:t>Slide</a:t>
-            </a:r>
-            <a:r>
-              <a:rPr/>
-              <a:t> </a:t>
-            </a:r>
-            <a:r>
-              <a:rPr/>
-              <a:t>with</a:t>
-            </a:r>
-            <a:r>
-              <a:rPr/>
-              <a:t> </a:t>
-            </a:r>
-            <a:r>
-              <a:rPr/>
-              <a:t>Bullets</a:t>
-            </a:r>
-          </a:p>
-        </p:txBody>
-      </p:sp>
-      <p:sp>
-        <p:nvSpPr>
-          <p:cNvPr id="3" name="Content Placeholder 2"/>
-          <p:cNvSpPr>
-            <a:spLocks noGrp="1"/>
-          </p:cNvSpPr>
-          <p:nvPr>
-            <p:ph idx="1"/>
-          </p:nvPr>
-        </p:nvSpPr>
-        <p:spPr/>
-        <p:txBody>
-          <a:bodyPr/>
-          <a:lstStyle/>
-          <a:p>
-            <a:pPr lvl="1"/>
-            <a:r>
-              <a:rPr/>
-              <a:t>Bullet 1</a:t>
-            </a:r>
-          </a:p>
-          <a:p>
-            <a:pPr lvl="1"/>
-            <a:r>
-              <a:rPr/>
-              <a:t>Bullet 2</a:t>
-            </a:r>
-          </a:p>
-          <a:p>
-            <a:pPr lvl="1"/>
-            <a:r>
-              <a:rPr/>
-              <a:t>Bullet 3</a:t>
+              <a:t>Slide with Plot</a:t>
             </a:r>
           </a:p>
         </p:txBody>
       </p:sp>
     </p:spTree>
   </p:cSld>
-</p:sld>
-</file>
-
-<file path=ppt/slides/slide4.xml><?xml version="1.0" encoding="utf-8"?>
-<p:sld xmlns:a="http://schemas.openxmlformats.org/drawingml/2006/main" xmlns:r="http://schemas.openxmlformats.org/officeDocument/2006/relationships" xmlns:p="http://schemas.openxmlformats.org/presentationml/2006/main">
-  <p:cSld>
-    <p:spTree>
-      <p:nvGrpSpPr>
-        <p:cNvPr id="1" name=""/>
-        <p:cNvGrpSpPr/>
-        <p:nvPr/>
-      </p:nvGrpSpPr>
-      <p:grpSpPr>
-        <a:xfrm>
-          <a:off x="0" y="0"/>
-          <a:ext cx="0" cy="0"/>
-          <a:chOff x="0" y="0"/>
-          <a:chExt cx="0" cy="0"/>
-        </a:xfrm>
-      </p:grpSpPr>
-      <p:sp>
-        <p:nvSpPr>
-          <p:cNvPr id="2" name="Title 1"/>
-          <p:cNvSpPr>
-            <a:spLocks noGrp="1"/>
-          </p:cNvSpPr>
-          <p:nvPr>
-            <p:ph type="title"/>
-          </p:nvPr>
-        </p:nvSpPr>
-        <p:spPr/>
-        <p:txBody>
-          <a:bodyPr/>
-          <a:lstStyle/>
-          <a:p>
-            <a:pPr lvl="0" marL="0" indent="0">
-              <a:buNone/>
-            </a:pPr>
-            <a:r>
-              <a:rPr/>
-              <a:t>Slide</a:t>
-            </a:r>
-            <a:r>
-              <a:rPr/>
-              <a:t> </a:t>
-            </a:r>
-            <a:r>
-              <a:rPr/>
-              <a:t>with</a:t>
-            </a:r>
-            <a:r>
-              <a:rPr/>
-              <a:t> </a:t>
-            </a:r>
-            <a:r>
-              <a:rPr/>
-              <a:t>R</a:t>
-            </a:r>
-            <a:r>
-              <a:rPr/>
-              <a:t> </a:t>
-            </a:r>
-            <a:r>
-              <a:rPr/>
-              <a:t>Output</a:t>
-            </a:r>
-          </a:p>
-        </p:txBody>
-      </p:sp>
-      <p:sp>
-        <p:nvSpPr>
-          <p:cNvPr id="3" name="Content Placeholder 2"/>
-          <p:cNvSpPr>
-            <a:spLocks noGrp="1"/>
-          </p:cNvSpPr>
-          <p:nvPr>
-            <p:ph idx="1"/>
-          </p:nvPr>
-        </p:nvSpPr>
-        <p:spPr/>
-        <p:txBody>
-          <a:bodyPr/>
-          <a:lstStyle/>
-          <a:p>
-            <a:pPr lvl="0" marL="1270000" indent="0">
-              <a:buNone/>
-            </a:pPr>
-            <a:r>
-              <a:rPr sz="1800" b="1">
-                <a:solidFill>
-                  <a:srgbClr val="007020"/>
-                </a:solidFill>
-                <a:latin typeface="Courier"/>
-              </a:rPr>
-              <a:t>summary</a:t>
-            </a:r>
-            <a:r>
-              <a:rPr sz="1800">
-                <a:latin typeface="Courier"/>
-              </a:rPr>
-              <a:t>(cars)</a:t>
-            </a:r>
-          </a:p>
-          <a:p>
-            <a:pPr lvl="0" marL="1270000" indent="0">
-              <a:buNone/>
-            </a:pPr>
-            <a:r>
-              <a:rPr sz="1800">
-                <a:latin typeface="Courier"/>
-              </a:rPr>
-              <a:t>##      speed           dist       
-##  Min.   : 4.0   Min.   :  2.00  
-##  1st Qu.:12.0   1st Qu.: 26.00  
-##  Median :15.0   Median : 36.00  
-##  Mean   :15.4   Mean   : 42.98  
-##  3rd Qu.:19.0   3rd Qu.: 56.00  
-##  Max.   :25.0   Max.   :120.00</a:t>
-            </a:r>
-          </a:p>
-        </p:txBody>
-      </p:sp>
-    </p:spTree>
-  </p:cSld>
-</p:sld>
-</file>
-
-<file path=ppt/slides/slide5.xml><?xml version="1.0" encoding="utf-8"?>
-<p:sld xmlns:a="http://schemas.openxmlformats.org/drawingml/2006/main" xmlns:r="http://schemas.openxmlformats.org/officeDocument/2006/relationships" xmlns:p="http://schemas.openxmlformats.org/presentationml/2006/main">
-  <p:cSld>
-    <p:spTree>
-      <p:nvGrpSpPr>
-        <p:cNvPr id="1" name=""/>
-        <p:cNvGrpSpPr/>
-        <p:nvPr/>
-      </p:nvGrpSpPr>
-      <p:grpSpPr>
-        <a:xfrm>
-          <a:off x="0" y="0"/>
-          <a:ext cx="0" cy="0"/>
-          <a:chOff x="0" y="0"/>
-          <a:chExt cx="0" cy="0"/>
-        </a:xfrm>
-      </p:grpSpPr>
-      <p:sp>
-        <p:nvSpPr>
-          <p:cNvPr id="2" name="Title 1"/>
-          <p:cNvSpPr>
-            <a:spLocks noGrp="1"/>
-          </p:cNvSpPr>
-          <p:nvPr>
-            <p:ph type="title"/>
-          </p:nvPr>
-        </p:nvSpPr>
-        <p:spPr/>
-        <p:txBody>
-          <a:bodyPr/>
-          <a:lstStyle/>
-          <a:p>
-            <a:pPr lvl="0" marL="0" indent="0">
-              <a:buNone/>
-            </a:pPr>
-            <a:r>
-              <a:rPr/>
-              <a:t>Slide</a:t>
-            </a:r>
-            <a:r>
-              <a:rPr/>
-              <a:t> </a:t>
-            </a:r>
-            <a:r>
-              <a:rPr/>
-              <a:t>with</a:t>
-            </a:r>
-            <a:r>
-              <a:rPr/>
-              <a:t> </a:t>
-            </a:r>
-            <a:r>
-              <a:rPr/>
-              <a:t>Plot</a:t>
-            </a:r>
-          </a:p>
-        </p:txBody>
-      </p:sp>
-      <p:pic>
-        <p:nvPicPr>
-          <p:cNvPr descr="SCDS-example-presentation_files/figure-pptx/pressure-1.png" id="0" name="Picture 1"/>
-          <p:cNvPicPr>
-            <a:picLocks noGrp="1" noChangeAspect="1"/>
-          </p:cNvPicPr>
-          <p:nvPr/>
-        </p:nvPicPr>
-        <p:blipFill>
-          <a:blip r:embed="rId2"/>
-          <a:stretch>
-            <a:fillRect/>
-          </a:stretch>
-        </p:blipFill>
-        <p:spPr bwMode="auto">
-          <a:xfrm>
-            <a:off x="1752600" y="1600200"/>
-            <a:ext cx="5651500" cy="4521200"/>
-          </a:xfrm>
-          <a:prstGeom prst="rect">
-            <a:avLst/>
-          </a:prstGeom>
-          <a:noFill/>
-          <a:ln w="9525">
-            <a:noFill/>
-            <a:headEnd/>
-            <a:tailEnd/>
-          </a:ln>
-        </p:spPr>
-      </p:pic>
-    </p:spTree>
-  </p:cSld>
+  <p:clrMapOvr>
+    <a:masterClrMapping/>
+  </p:clrMapOvr>
 </p:sld>
 </file>
 

</xml_diff>